<commit_message>
Korrekturen und Bereitstellung der gehaltenen Präsentationsfolien
</commit_message>
<xml_diff>
--- a/02-deployments-in-kubernetes/deeptalk-02.pptx
+++ b/02-deployments-in-kubernetes/deeptalk-02.pptx
@@ -9549,7 +9549,7 @@
               </a:rPr>
               <a:t>https://github.com/grothesk/deeptalk</a:t>
             </a:r>
-            <a:endParaRPr lang="de-DE"/>
+            <a:endParaRPr lang="de-DE" dirty="0"/>
           </a:p>
           <a:p>
             <a:endParaRPr lang="de-DE" dirty="0"/>
@@ -10305,7 +10305,7 @@
             </a:pPr>
             <a:r>
               <a:rPr lang="de-DE" dirty="0"/>
-              <a:t>…Services bleiben bestehen (Name , Adresse, Port)</a:t>
+              <a:t>…Services bleiben bestehen (Name , Namespace, Adresse, Port)</a:t>
             </a:r>
           </a:p>
           <a:p>

</xml_diff>